<commit_message>
Modify all ltspice exercises to be dark mode
</commit_message>
<xml_diff>
--- a/Exercise 1/E1.pptx
+++ b/Exercise 1/E1.pptx
@@ -260,7 +260,7 @@
           <a:p>
             <a:fld id="{E17F7779-9C11-46A1-9C91-FCD18852C054}" type="datetimeFigureOut">
               <a:rPr lang="en-GB" smtClean="0"/>
-              <a:t>04/12/2023</a:t>
+              <a:t>01/01/2024</a:t>
             </a:fld>
             <a:endParaRPr lang="en-GB"/>
           </a:p>
@@ -458,7 +458,7 @@
           <a:p>
             <a:fld id="{E17F7779-9C11-46A1-9C91-FCD18852C054}" type="datetimeFigureOut">
               <a:rPr lang="en-GB" smtClean="0"/>
-              <a:t>04/12/2023</a:t>
+              <a:t>01/01/2024</a:t>
             </a:fld>
             <a:endParaRPr lang="en-GB"/>
           </a:p>
@@ -666,7 +666,7 @@
           <a:p>
             <a:fld id="{E17F7779-9C11-46A1-9C91-FCD18852C054}" type="datetimeFigureOut">
               <a:rPr lang="en-GB" smtClean="0"/>
-              <a:t>04/12/2023</a:t>
+              <a:t>01/01/2024</a:t>
             </a:fld>
             <a:endParaRPr lang="en-GB"/>
           </a:p>
@@ -864,7 +864,7 @@
           <a:p>
             <a:fld id="{E17F7779-9C11-46A1-9C91-FCD18852C054}" type="datetimeFigureOut">
               <a:rPr lang="en-GB" smtClean="0"/>
-              <a:t>04/12/2023</a:t>
+              <a:t>01/01/2024</a:t>
             </a:fld>
             <a:endParaRPr lang="en-GB"/>
           </a:p>
@@ -1139,7 +1139,7 @@
           <a:p>
             <a:fld id="{E17F7779-9C11-46A1-9C91-FCD18852C054}" type="datetimeFigureOut">
               <a:rPr lang="en-GB" smtClean="0"/>
-              <a:t>04/12/2023</a:t>
+              <a:t>01/01/2024</a:t>
             </a:fld>
             <a:endParaRPr lang="en-GB"/>
           </a:p>
@@ -1404,7 +1404,7 @@
           <a:p>
             <a:fld id="{E17F7779-9C11-46A1-9C91-FCD18852C054}" type="datetimeFigureOut">
               <a:rPr lang="en-GB" smtClean="0"/>
-              <a:t>04/12/2023</a:t>
+              <a:t>01/01/2024</a:t>
             </a:fld>
             <a:endParaRPr lang="en-GB"/>
           </a:p>
@@ -1816,7 +1816,7 @@
           <a:p>
             <a:fld id="{E17F7779-9C11-46A1-9C91-FCD18852C054}" type="datetimeFigureOut">
               <a:rPr lang="en-GB" smtClean="0"/>
-              <a:t>04/12/2023</a:t>
+              <a:t>01/01/2024</a:t>
             </a:fld>
             <a:endParaRPr lang="en-GB"/>
           </a:p>
@@ -1957,7 +1957,7 @@
           <a:p>
             <a:fld id="{E17F7779-9C11-46A1-9C91-FCD18852C054}" type="datetimeFigureOut">
               <a:rPr lang="en-GB" smtClean="0"/>
-              <a:t>04/12/2023</a:t>
+              <a:t>01/01/2024</a:t>
             </a:fld>
             <a:endParaRPr lang="en-GB"/>
           </a:p>
@@ -2070,7 +2070,7 @@
           <a:p>
             <a:fld id="{E17F7779-9C11-46A1-9C91-FCD18852C054}" type="datetimeFigureOut">
               <a:rPr lang="en-GB" smtClean="0"/>
-              <a:t>04/12/2023</a:t>
+              <a:t>01/01/2024</a:t>
             </a:fld>
             <a:endParaRPr lang="en-GB"/>
           </a:p>
@@ -2381,7 +2381,7 @@
           <a:p>
             <a:fld id="{E17F7779-9C11-46A1-9C91-FCD18852C054}" type="datetimeFigureOut">
               <a:rPr lang="en-GB" smtClean="0"/>
-              <a:t>04/12/2023</a:t>
+              <a:t>01/01/2024</a:t>
             </a:fld>
             <a:endParaRPr lang="en-GB"/>
           </a:p>
@@ -2669,7 +2669,7 @@
           <a:p>
             <a:fld id="{E17F7779-9C11-46A1-9C91-FCD18852C054}" type="datetimeFigureOut">
               <a:rPr lang="en-GB" smtClean="0"/>
-              <a:t>04/12/2023</a:t>
+              <a:t>01/01/2024</a:t>
             </a:fld>
             <a:endParaRPr lang="en-GB"/>
           </a:p>
@@ -2910,7 +2910,7 @@
           <a:p>
             <a:fld id="{E17F7779-9C11-46A1-9C91-FCD18852C054}" type="datetimeFigureOut">
               <a:rPr lang="en-GB" smtClean="0"/>
-              <a:t>04/12/2023</a:t>
+              <a:t>01/01/2024</a:t>
             </a:fld>
             <a:endParaRPr lang="en-GB"/>
           </a:p>
@@ -3313,6 +3313,14 @@
 <file path=ppt/slides/slide1.xml><?xml version="1.0" encoding="utf-8"?>
 <p:sld xmlns:a="http://schemas.openxmlformats.org/drawingml/2006/main" xmlns:r="http://schemas.openxmlformats.org/officeDocument/2006/relationships" xmlns:p="http://schemas.openxmlformats.org/presentationml/2006/main">
   <p:cSld>
+    <p:bg>
+      <p:bgPr>
+        <a:solidFill>
+          <a:schemeClr val="tx1"/>
+        </a:solidFill>
+        <a:effectLst/>
+      </p:bgPr>
+    </p:bg>
     <p:spTree>
       <p:nvGrpSpPr>
         <p:cNvPr id="1" name=""/>
@@ -3349,7 +3357,11 @@
           <a:lstStyle/>
           <a:p>
             <a:r>
-              <a:rPr lang="en-GB" dirty="0"/>
+              <a:rPr lang="en-GB" dirty="0">
+                <a:solidFill>
+                  <a:schemeClr val="bg1"/>
+                </a:solidFill>
+              </a:rPr>
               <a:t>Exercise E1</a:t>
             </a:r>
           </a:p>
@@ -3371,7 +3383,7 @@
             <p:ph idx="1"/>
           </p:nvPr>
         </p:nvPicPr>
-        <p:blipFill>
+        <p:blipFill rotWithShape="1">
           <a:blip r:embed="rId2">
             <a:extLst>
               <a:ext uri="{28A0092B-C50C-407E-A947-70E740481C1C}">
@@ -3379,19 +3391,18 @@
               </a:ext>
             </a:extLst>
           </a:blip>
-          <a:stretch>
-            <a:fillRect/>
-          </a:stretch>
+          <a:srcRect t="929"/>
+          <a:stretch/>
         </p:blipFill>
         <p:spPr>
           <a:xfrm>
-            <a:off x="751288" y="1690688"/>
-            <a:ext cx="8095532" cy="3473735"/>
+            <a:off x="751288" y="1722967"/>
+            <a:ext cx="8095532" cy="3441456"/>
           </a:xfrm>
         </p:spPr>
       </p:pic>
-      <mc:AlternateContent xmlns:mc="http://schemas.openxmlformats.org/markup-compatibility/2006" xmlns:a14="http://schemas.microsoft.com/office/drawing/2010/main">
-        <mc:Choice Requires="a14">
+      <mc:AlternateContent xmlns:mc="http://schemas.openxmlformats.org/markup-compatibility/2006">
+        <mc:Choice xmlns:a14="http://schemas.microsoft.com/office/drawing/2010/main" Requires="a14">
           <p:sp>
             <p:nvSpPr>
               <p:cNvPr id="6" name="TextBox 5">
@@ -3426,6 +3437,9 @@
                       <m:fPr>
                         <m:ctrlPr>
                           <a:rPr lang="en-GB" sz="2800" b="0" i="1" dirty="0" smtClean="0">
+                            <a:solidFill>
+                              <a:schemeClr val="bg1"/>
+                            </a:solidFill>
                             <a:latin typeface="Cambria Math" panose="02040503050406030204" pitchFamily="18" charset="0"/>
                           </a:rPr>
                         </m:ctrlPr>
@@ -3433,6 +3447,9 @@
                       <m:num>
                         <m:r>
                           <a:rPr lang="en-GB" sz="2800" b="0" i="1" dirty="0" smtClean="0">
+                            <a:solidFill>
+                              <a:schemeClr val="bg1"/>
+                            </a:solidFill>
                             <a:latin typeface="Cambria Math" panose="02040503050406030204" pitchFamily="18" charset="0"/>
                           </a:rPr>
                           <m:t>1</m:t>
@@ -3441,6 +3458,9 @@
                       <m:den>
                         <m:r>
                           <a:rPr lang="en-GB" sz="2800" b="0" i="1" dirty="0" smtClean="0">
+                            <a:solidFill>
+                              <a:schemeClr val="bg1"/>
+                            </a:solidFill>
                             <a:latin typeface="Cambria Math" panose="02040503050406030204" pitchFamily="18" charset="0"/>
                           </a:rPr>
                           <m:t>𝑅</m:t>
@@ -3449,12 +3469,18 @@
                     </m:f>
                     <m:r>
                       <a:rPr lang="en-GB" sz="2800" b="0" i="1" dirty="0" smtClean="0">
+                        <a:solidFill>
+                          <a:schemeClr val="bg1"/>
+                        </a:solidFill>
                         <a:latin typeface="Cambria Math" panose="02040503050406030204" pitchFamily="18" charset="0"/>
                       </a:rPr>
                       <m:t>=2.1028</m:t>
                     </m:r>
                     <m:r>
                       <a:rPr lang="en-GB" sz="2800" b="0" i="1" dirty="0" smtClean="0">
+                        <a:solidFill>
+                          <a:schemeClr val="bg1"/>
+                        </a:solidFill>
                         <a:latin typeface="Cambria Math" panose="02040503050406030204" pitchFamily="18" charset="0"/>
                       </a:rPr>
                       <m:t>𝑚</m:t>
@@ -3463,6 +3489,9 @@
                       <m:sSupPr>
                         <m:ctrlPr>
                           <a:rPr lang="en-GB" sz="2800" b="0" i="1" dirty="0" smtClean="0">
+                            <a:solidFill>
+                              <a:schemeClr val="bg1"/>
+                            </a:solidFill>
                             <a:latin typeface="Cambria Math" panose="02040503050406030204" pitchFamily="18" charset="0"/>
                           </a:rPr>
                         </m:ctrlPr>
@@ -3470,6 +3499,9 @@
                       <m:e>
                         <m:r>
                           <a:rPr lang="el-GR" sz="2800" b="0" i="1" dirty="0" smtClean="0">
+                            <a:solidFill>
+                              <a:schemeClr val="bg1"/>
+                            </a:solidFill>
                             <a:latin typeface="Cambria Math" panose="02040503050406030204" pitchFamily="18" charset="0"/>
                           </a:rPr>
                           <m:t>Ω</m:t>
@@ -3478,6 +3510,9 @@
                       <m:sup>
                         <m:r>
                           <a:rPr lang="en-GB" sz="2800" b="0" i="1" dirty="0" smtClean="0">
+                            <a:solidFill>
+                              <a:schemeClr val="bg1"/>
+                            </a:solidFill>
                             <a:latin typeface="Cambria Math" panose="02040503050406030204" pitchFamily="18" charset="0"/>
                           </a:rPr>
                           <m:t>−1</m:t>
@@ -3487,31 +3522,45 @@
                   </m:oMath>
                 </a14:m>
                 <a:r>
-                  <a:rPr lang="en-GB" sz="2800" dirty="0"/>
+                  <a:rPr lang="en-GB" sz="2800" dirty="0">
+                    <a:solidFill>
+                      <a:schemeClr val="bg1"/>
+                    </a:solidFill>
+                  </a:rPr>
                   <a:t>, </a:t>
                 </a:r>
                 <a14:m>
                   <m:oMath xmlns:m="http://schemas.openxmlformats.org/officeDocument/2006/math">
                     <m:r>
                       <a:rPr lang="en-GB" sz="2800" b="0" i="1" smtClean="0">
+                        <a:solidFill>
+                          <a:schemeClr val="bg1"/>
+                        </a:solidFill>
                         <a:latin typeface="Cambria Math" panose="02040503050406030204" pitchFamily="18" charset="0"/>
                       </a:rPr>
                       <m:t>𝑅</m:t>
                     </m:r>
                     <m:r>
                       <a:rPr lang="en-GB" sz="2800" b="0" i="1" smtClean="0">
+                        <a:solidFill>
+                          <a:schemeClr val="bg1"/>
+                        </a:solidFill>
                         <a:latin typeface="Cambria Math" panose="02040503050406030204" pitchFamily="18" charset="0"/>
                       </a:rPr>
                       <m:t>=475.56Ω</m:t>
                     </m:r>
                   </m:oMath>
                 </a14:m>
-                <a:endParaRPr lang="en-GB" sz="2800" dirty="0"/>
+                <a:endParaRPr lang="en-GB" sz="2800" dirty="0">
+                  <a:solidFill>
+                    <a:schemeClr val="bg1"/>
+                  </a:solidFill>
+                </a:endParaRPr>
               </a:p>
             </p:txBody>
           </p:sp>
         </mc:Choice>
-        <mc:Fallback xmlns="">
+        <mc:Fallback>
           <p:sp>
             <p:nvSpPr>
               <p:cNvPr id="6" name="TextBox 5">
@@ -3572,6 +3621,14 @@
 <file path=ppt/slides/slide2.xml><?xml version="1.0" encoding="utf-8"?>
 <p:sld xmlns:a="http://schemas.openxmlformats.org/drawingml/2006/main" xmlns:r="http://schemas.openxmlformats.org/officeDocument/2006/relationships" xmlns:p="http://schemas.openxmlformats.org/presentationml/2006/main">
   <p:cSld>
+    <p:bg>
+      <p:bgPr>
+        <a:solidFill>
+          <a:schemeClr val="tx1"/>
+        </a:solidFill>
+        <a:effectLst/>
+      </p:bgPr>
+    </p:bg>
     <p:spTree>
       <p:nvGrpSpPr>
         <p:cNvPr id="1" name=""/>
@@ -3608,7 +3665,11 @@
           <a:lstStyle/>
           <a:p>
             <a:r>
-              <a:rPr lang="en-GB" dirty="0"/>
+              <a:rPr lang="en-GB" dirty="0">
+                <a:solidFill>
+                  <a:schemeClr val="bg1"/>
+                </a:solidFill>
+              </a:rPr>
               <a:t>Exercise E1</a:t>
             </a:r>
           </a:p>
@@ -3648,18 +3709,27 @@
                   <m:oMath xmlns:m="http://schemas.openxmlformats.org/officeDocument/2006/math">
                     <m:r>
                       <a:rPr lang="en-GB" sz="2800" b="0" i="1" dirty="0" smtClean="0">
+                        <a:solidFill>
+                          <a:schemeClr val="bg1"/>
+                        </a:solidFill>
                         <a:latin typeface="Cambria Math" panose="02040503050406030204" pitchFamily="18" charset="0"/>
                       </a:rPr>
                       <m:t>𝐼</m:t>
                     </m:r>
                     <m:r>
                       <a:rPr lang="en-GB" sz="2800" b="0" i="1" dirty="0" smtClean="0">
+                        <a:solidFill>
+                          <a:schemeClr val="bg1"/>
+                        </a:solidFill>
                         <a:latin typeface="Cambria Math" panose="02040503050406030204" pitchFamily="18" charset="0"/>
                       </a:rPr>
                       <m:t>=9.171</m:t>
                     </m:r>
                     <m:r>
                       <a:rPr lang="en-GB" sz="2800" b="0" i="1" dirty="0" smtClean="0">
+                        <a:solidFill>
+                          <a:schemeClr val="bg1"/>
+                        </a:solidFill>
                         <a:latin typeface="Cambria Math" panose="02040503050406030204" pitchFamily="18" charset="0"/>
                       </a:rPr>
                       <m:t>𝑚𝐴</m:t>
@@ -3667,34 +3737,52 @@
                   </m:oMath>
                 </a14:m>
                 <a:r>
-                  <a:rPr lang="en-GB" sz="2800" dirty="0"/>
+                  <a:rPr lang="en-GB" sz="2800" dirty="0">
+                    <a:solidFill>
+                      <a:schemeClr val="bg1"/>
+                    </a:solidFill>
+                  </a:rPr>
                   <a:t> when </a:t>
                 </a:r>
                 <a14:m>
                   <m:oMath xmlns:m="http://schemas.openxmlformats.org/officeDocument/2006/math">
                     <m:r>
                       <a:rPr lang="en-GB" sz="2800" b="0" i="1" smtClean="0">
+                        <a:solidFill>
+                          <a:schemeClr val="bg1"/>
+                        </a:solidFill>
                         <a:latin typeface="Cambria Math" panose="02040503050406030204" pitchFamily="18" charset="0"/>
                       </a:rPr>
                       <m:t>𝑉</m:t>
                     </m:r>
                     <m:r>
                       <a:rPr lang="en-GB" sz="2800" b="0" i="1" smtClean="0">
+                        <a:solidFill>
+                          <a:schemeClr val="bg1"/>
+                        </a:solidFill>
                         <a:latin typeface="Cambria Math" panose="02040503050406030204" pitchFamily="18" charset="0"/>
                       </a:rPr>
                       <m:t>=5.0</m:t>
                     </m:r>
                     <m:r>
                       <a:rPr lang="en-GB" sz="2800" b="0" i="1" smtClean="0">
+                        <a:solidFill>
+                          <a:schemeClr val="bg1"/>
+                        </a:solidFill>
                         <a:latin typeface="Cambria Math" panose="02040503050406030204" pitchFamily="18" charset="0"/>
                       </a:rPr>
                       <m:t>𝑉</m:t>
                     </m:r>
                   </m:oMath>
                 </a14:m>
-                <a:endParaRPr lang="en-GB" sz="2800" b="0" dirty="0"/>
+                <a:endParaRPr lang="en-GB" sz="2800" b="0" dirty="0">
+                  <a:solidFill>
+                    <a:schemeClr val="bg1"/>
+                  </a:solidFill>
+                </a:endParaRPr>
               </a:p>
               <a:p>
+                <a:pPr/>
                 <a14:m>
                   <m:oMathPara xmlns:m="http://schemas.openxmlformats.org/officeDocument/2006/math">
                     <m:oMathParaPr>
@@ -3705,6 +3793,9 @@
                         <m:sSubPr>
                           <m:ctrlPr>
                             <a:rPr lang="en-GB" sz="2800" b="0" i="1" smtClean="0">
+                              <a:solidFill>
+                                <a:schemeClr val="bg1"/>
+                              </a:solidFill>
                               <a:latin typeface="Cambria Math" panose="02040503050406030204" pitchFamily="18" charset="0"/>
                             </a:rPr>
                           </m:ctrlPr>
@@ -3712,6 +3803,9 @@
                         <m:e>
                           <m:r>
                             <a:rPr lang="en-GB" sz="2800" b="0" i="1" smtClean="0">
+                              <a:solidFill>
+                                <a:schemeClr val="bg1"/>
+                              </a:solidFill>
                               <a:latin typeface="Cambria Math" panose="02040503050406030204" pitchFamily="18" charset="0"/>
                             </a:rPr>
                             <m:t>𝑉</m:t>
@@ -3720,6 +3814,9 @@
                         <m:sub>
                           <m:r>
                             <a:rPr lang="en-GB" sz="2800" b="0" i="1" smtClean="0">
+                              <a:solidFill>
+                                <a:schemeClr val="bg1"/>
+                              </a:solidFill>
                               <a:latin typeface="Cambria Math" panose="02040503050406030204" pitchFamily="18" charset="0"/>
                             </a:rPr>
                             <m:t>𝑓</m:t>
@@ -3728,42 +3825,63 @@
                       </m:sSub>
                       <m:r>
                         <a:rPr lang="en-GB" sz="2800" b="0" i="1" smtClean="0">
+                          <a:solidFill>
+                            <a:schemeClr val="bg1"/>
+                          </a:solidFill>
                           <a:latin typeface="Cambria Math" panose="02040503050406030204" pitchFamily="18" charset="0"/>
                         </a:rPr>
                         <m:t>=</m:t>
                       </m:r>
                       <m:r>
                         <a:rPr lang="en-GB" sz="2800" b="0" i="1" smtClean="0">
+                          <a:solidFill>
+                            <a:schemeClr val="bg1"/>
+                          </a:solidFill>
                           <a:latin typeface="Cambria Math" panose="02040503050406030204" pitchFamily="18" charset="0"/>
                         </a:rPr>
                         <m:t>𝑉</m:t>
                       </m:r>
                       <m:r>
                         <a:rPr lang="en-GB" sz="2800" b="0" i="1" smtClean="0">
+                          <a:solidFill>
+                            <a:schemeClr val="bg1"/>
+                          </a:solidFill>
                           <a:latin typeface="Cambria Math" panose="02040503050406030204" pitchFamily="18" charset="0"/>
                         </a:rPr>
                         <m:t>−</m:t>
                       </m:r>
                       <m:r>
                         <a:rPr lang="en-GB" sz="2800" b="0" i="1" smtClean="0">
+                          <a:solidFill>
+                            <a:schemeClr val="bg1"/>
+                          </a:solidFill>
                           <a:latin typeface="Cambria Math" panose="02040503050406030204" pitchFamily="18" charset="0"/>
                         </a:rPr>
                         <m:t>𝐼𝑅</m:t>
                       </m:r>
                       <m:r>
                         <a:rPr lang="en-GB" sz="2800" b="0" i="1" smtClean="0">
+                          <a:solidFill>
+                            <a:schemeClr val="bg1"/>
+                          </a:solidFill>
                           <a:latin typeface="Cambria Math" panose="02040503050406030204" pitchFamily="18" charset="0"/>
                         </a:rPr>
                         <m:t>=0.639</m:t>
                       </m:r>
                       <m:r>
                         <a:rPr lang="en-GB" sz="2800" b="0" i="1" smtClean="0">
+                          <a:solidFill>
+                            <a:schemeClr val="bg1"/>
+                          </a:solidFill>
                           <a:latin typeface="Cambria Math" panose="02040503050406030204" pitchFamily="18" charset="0"/>
                         </a:rPr>
                         <m:t>𝑉</m:t>
                       </m:r>
                       <m:r>
                         <a:rPr lang="en-GB" sz="2800" b="0" i="1" smtClean="0">
+                          <a:solidFill>
+                            <a:schemeClr val="bg1"/>
+                          </a:solidFill>
                           <a:latin typeface="Cambria Math" panose="02040503050406030204" pitchFamily="18" charset="0"/>
                         </a:rPr>
                         <m:t> </m:t>
@@ -3771,7 +3889,11 @@
                     </m:oMath>
                   </m:oMathPara>
                 </a14:m>
-                <a:endParaRPr lang="en-GB" sz="2800" dirty="0"/>
+                <a:endParaRPr lang="en-GB" sz="2800" dirty="0">
+                  <a:solidFill>
+                    <a:schemeClr val="bg1"/>
+                  </a:solidFill>
+                </a:endParaRPr>
               </a:p>
             </p:txBody>
           </p:sp>
@@ -3837,7 +3959,7 @@
             <p:ph idx="1"/>
           </p:nvPr>
         </p:nvPicPr>
-        <p:blipFill>
+        <p:blipFill rotWithShape="1">
           <a:blip r:embed="rId3">
             <a:extLst>
               <a:ext uri="{28A0092B-C50C-407E-A947-70E740481C1C}">
@@ -3845,14 +3967,13 @@
               </a:ext>
             </a:extLst>
           </a:blip>
-          <a:stretch>
-            <a:fillRect/>
-          </a:stretch>
+          <a:srcRect t="559"/>
+          <a:stretch/>
         </p:blipFill>
         <p:spPr>
           <a:xfrm>
-            <a:off x="838199" y="1551305"/>
-            <a:ext cx="8509171" cy="3637915"/>
+            <a:off x="838199" y="1571625"/>
+            <a:ext cx="8509171" cy="3617595"/>
           </a:xfrm>
         </p:spPr>
       </p:pic>

</xml_diff>